<commit_message>
Addition of Basics MQTT VI
</commit_message>
<xml_diff>
--- a/MLUG 20221109 MQTT.pptx
+++ b/MLUG 20221109 MQTT.pptx
@@ -5757,6 +5757,53 @@
           <a:chExt cx="0" cy="0"/>
         </a:xfrm>
       </p:grpSpPr>
+      <p:pic>
+        <p:nvPicPr>
+          <p:cNvPr id="1028" name="Picture 4" descr="MLUG - Argenta - Product Reliability and Process Improvement solutions">
+            <a:extLst>
+              <a:ext uri="{FF2B5EF4-FFF2-40B4-BE49-F238E27FC236}">
+                <a16:creationId xmlns:a16="http://schemas.microsoft.com/office/drawing/2014/main" id="{F71BD01D-661E-D985-CAC0-637F6A940F03}"/>
+              </a:ext>
+            </a:extLst>
+          </p:cNvPr>
+          <p:cNvPicPr>
+            <a:picLocks noChangeAspect="1" noChangeArrowheads="1"/>
+          </p:cNvPicPr>
+          <p:nvPr/>
+        </p:nvPicPr>
+        <p:blipFill>
+          <a:blip r:embed="rId2">
+            <a:extLst>
+              <a:ext uri="{28A0092B-C50C-407E-A947-70E740481C1C}">
+                <a14:useLocalDpi xmlns:a14="http://schemas.microsoft.com/office/drawing/2010/main" val="0"/>
+              </a:ext>
+            </a:extLst>
+          </a:blip>
+          <a:srcRect/>
+          <a:stretch>
+            <a:fillRect/>
+          </a:stretch>
+        </p:blipFill>
+        <p:spPr bwMode="auto">
+          <a:xfrm>
+            <a:off x="1172028" y="2278335"/>
+            <a:ext cx="3736592" cy="1355481"/>
+          </a:xfrm>
+          <a:prstGeom prst="rect">
+            <a:avLst/>
+          </a:prstGeom>
+          <a:noFill/>
+          <a:extLst>
+            <a:ext uri="{909E8E84-426E-40DD-AFC4-6F175D3DCCD1}">
+              <a14:hiddenFill xmlns:a14="http://schemas.microsoft.com/office/drawing/2010/main">
+                <a:solidFill>
+                  <a:srgbClr val="FFFFFF"/>
+                </a:solidFill>
+              </a14:hiddenFill>
+            </a:ext>
+          </a:extLst>
+        </p:spPr>
+      </p:pic>
       <p:sp>
         <p:nvSpPr>
           <p:cNvPr id="2" name="Titre 1">
@@ -5958,7 +6005,7 @@
           <p:nvPr/>
         </p:nvPicPr>
         <p:blipFill>
-          <a:blip r:embed="rId2"/>
+          <a:blip r:embed="rId3"/>
           <a:stretch>
             <a:fillRect/>
           </a:stretch>
@@ -5988,7 +6035,7 @@
           <p:nvPr/>
         </p:nvPicPr>
         <p:blipFill>
-          <a:blip r:embed="rId3"/>
+          <a:blip r:embed="rId4"/>
           <a:stretch>
             <a:fillRect/>
           </a:stretch>
@@ -6018,7 +6065,7 @@
           <p:nvPr/>
         </p:nvPicPr>
         <p:blipFill>
-          <a:blip r:embed="rId4"/>
+          <a:blip r:embed="rId5"/>
           <a:stretch>
             <a:fillRect/>
           </a:stretch>
@@ -6048,7 +6095,7 @@
           <p:nvPr/>
         </p:nvPicPr>
         <p:blipFill>
-          <a:blip r:embed="rId5"/>
+          <a:blip r:embed="rId6"/>
           <a:stretch>
             <a:fillRect/>
           </a:stretch>
@@ -6077,8 +6124,8 @@
         </p:nvSpPr>
         <p:spPr>
           <a:xfrm>
-            <a:off x="1171976" y="2183634"/>
-            <a:ext cx="1715534" cy="646331"/>
+            <a:off x="3802589" y="3386850"/>
+            <a:ext cx="1053494" cy="307777"/>
           </a:xfrm>
           <a:prstGeom prst="rect">
             <a:avLst/>
@@ -6092,15 +6139,17 @@
           <a:p>
             <a:pPr fontAlgn="base"/>
             <a:r>
-              <a:rPr lang="fr-CA" b="1" dirty="0"/>
-              <a:t>MLUG Meeting</a:t>
-            </a:r>
-          </a:p>
-          <a:p>
-            <a:pPr fontAlgn="base"/>
-            <a:r>
-              <a:rPr lang="fr-CA" b="1" dirty="0"/>
-              <a:t>2022-11-09</a:t>
+              <a:rPr lang="fr-CA" sz="1400" dirty="0">
+                <a:solidFill>
+                  <a:schemeClr val="accent4">
+                    <a:lumMod val="60000"/>
+                    <a:lumOff val="40000"/>
+                  </a:schemeClr>
+                </a:solidFill>
+                <a:latin typeface="Calibri" panose="020F0502020204030204" pitchFamily="34" charset="0"/>
+                <a:cs typeface="Calibri" panose="020F0502020204030204" pitchFamily="34" charset="0"/>
+              </a:rPr>
+              <a:t>2022/11/09</a:t>
             </a:r>
           </a:p>
         </p:txBody>
@@ -6120,7 +6169,7 @@
           <p:nvPr/>
         </p:nvPicPr>
         <p:blipFill>
-          <a:blip r:embed="rId6">
+          <a:blip r:embed="rId7">
             <a:extLst>
               <a:ext uri="{28A0092B-C50C-407E-A947-70E740481C1C}">
                 <a14:useLocalDpi xmlns:a14="http://schemas.microsoft.com/office/drawing/2010/main" val="0"/>
@@ -11919,7 +11968,7 @@
         </p:blipFill>
         <p:spPr>
           <a:xfrm>
-            <a:off x="4957988" y="3960148"/>
+            <a:off x="3460871" y="3520790"/>
             <a:ext cx="5270257" cy="2711945"/>
           </a:xfrm>
           <a:prstGeom prst="rect">
@@ -11949,7 +11998,7 @@
         </p:blipFill>
         <p:spPr>
           <a:xfrm>
-            <a:off x="10350472" y="4267239"/>
+            <a:off x="5538856" y="2819476"/>
             <a:ext cx="1114286" cy="609524"/>
           </a:xfrm>
           <a:prstGeom prst="rect">

</xml_diff>